<commit_message>
some minor refactoring. added some presentation slides.
</commit_message>
<xml_diff>
--- a/Project/AT/docs/Adaptive_Threshold_Presentation.pptx
+++ b/Project/AT/docs/Adaptive_Threshold_Presentation.pptx
@@ -19,11 +19,17 @@
     <p:sldId id="270" r:id="rId13"/>
     <p:sldId id="271" r:id="rId14"/>
     <p:sldId id="272" r:id="rId15"/>
-    <p:sldId id="273" r:id="rId16"/>
-    <p:sldId id="274" r:id="rId17"/>
-    <p:sldId id="275" r:id="rId18"/>
-    <p:sldId id="276" r:id="rId19"/>
-    <p:sldId id="277" r:id="rId20"/>
+    <p:sldId id="278" r:id="rId16"/>
+    <p:sldId id="279" r:id="rId17"/>
+    <p:sldId id="280" r:id="rId18"/>
+    <p:sldId id="273" r:id="rId19"/>
+    <p:sldId id="274" r:id="rId20"/>
+    <p:sldId id="275" r:id="rId21"/>
+    <p:sldId id="282" r:id="rId22"/>
+    <p:sldId id="281" r:id="rId23"/>
+    <p:sldId id="283" r:id="rId24"/>
+    <p:sldId id="276" r:id="rId25"/>
+    <p:sldId id="277" r:id="rId26"/>
   </p:sldIdLst>
   <p:sldSz cx="12192000" cy="6858000"/>
   <p:notesSz cx="6858000" cy="9144000"/>
@@ -122,6 +128,11 @@
       </a:defRPr>
     </a:lvl9pPr>
   </p:defaultTextStyle>
+  <p:extLst>
+    <p:ext uri="{EFAFB233-063F-42B5-8137-9DF3F51BA10A}">
+      <p15:sldGuideLst xmlns:p15="http://schemas.microsoft.com/office/powerpoint/2012/main"/>
+    </p:ext>
+  </p:extLst>
 </p:presentation>
 </file>
 
@@ -272,7 +283,7 @@
           <a:p>
             <a:fld id="{F824BB33-C0D3-F347-9F38-B235B62BC7C3}" type="datetimeFigureOut">
               <a:rPr lang="en-US" smtClean="0"/>
-              <a:t>12/9/21</a:t>
+              <a:t>12/10/21</a:t>
             </a:fld>
             <a:endParaRPr lang="en-US"/>
           </a:p>
@@ -470,7 +481,7 @@
           <a:p>
             <a:fld id="{F824BB33-C0D3-F347-9F38-B235B62BC7C3}" type="datetimeFigureOut">
               <a:rPr lang="en-US" smtClean="0"/>
-              <a:t>12/9/21</a:t>
+              <a:t>12/10/21</a:t>
             </a:fld>
             <a:endParaRPr lang="en-US"/>
           </a:p>
@@ -678,7 +689,7 @@
           <a:p>
             <a:fld id="{F824BB33-C0D3-F347-9F38-B235B62BC7C3}" type="datetimeFigureOut">
               <a:rPr lang="en-US" smtClean="0"/>
-              <a:t>12/9/21</a:t>
+              <a:t>12/10/21</a:t>
             </a:fld>
             <a:endParaRPr lang="en-US"/>
           </a:p>
@@ -876,7 +887,7 @@
           <a:p>
             <a:fld id="{F824BB33-C0D3-F347-9F38-B235B62BC7C3}" type="datetimeFigureOut">
               <a:rPr lang="en-US" smtClean="0"/>
-              <a:t>12/9/21</a:t>
+              <a:t>12/10/21</a:t>
             </a:fld>
             <a:endParaRPr lang="en-US"/>
           </a:p>
@@ -1151,7 +1162,7 @@
           <a:p>
             <a:fld id="{F824BB33-C0D3-F347-9F38-B235B62BC7C3}" type="datetimeFigureOut">
               <a:rPr lang="en-US" smtClean="0"/>
-              <a:t>12/9/21</a:t>
+              <a:t>12/10/21</a:t>
             </a:fld>
             <a:endParaRPr lang="en-US"/>
           </a:p>
@@ -1416,7 +1427,7 @@
           <a:p>
             <a:fld id="{F824BB33-C0D3-F347-9F38-B235B62BC7C3}" type="datetimeFigureOut">
               <a:rPr lang="en-US" smtClean="0"/>
-              <a:t>12/9/21</a:t>
+              <a:t>12/10/21</a:t>
             </a:fld>
             <a:endParaRPr lang="en-US"/>
           </a:p>
@@ -1828,7 +1839,7 @@
           <a:p>
             <a:fld id="{F824BB33-C0D3-F347-9F38-B235B62BC7C3}" type="datetimeFigureOut">
               <a:rPr lang="en-US" smtClean="0"/>
-              <a:t>12/9/21</a:t>
+              <a:t>12/10/21</a:t>
             </a:fld>
             <a:endParaRPr lang="en-US"/>
           </a:p>
@@ -1969,7 +1980,7 @@
           <a:p>
             <a:fld id="{F824BB33-C0D3-F347-9F38-B235B62BC7C3}" type="datetimeFigureOut">
               <a:rPr lang="en-US" smtClean="0"/>
-              <a:t>12/9/21</a:t>
+              <a:t>12/10/21</a:t>
             </a:fld>
             <a:endParaRPr lang="en-US"/>
           </a:p>
@@ -2082,7 +2093,7 @@
           <a:p>
             <a:fld id="{F824BB33-C0D3-F347-9F38-B235B62BC7C3}" type="datetimeFigureOut">
               <a:rPr lang="en-US" smtClean="0"/>
-              <a:t>12/9/21</a:t>
+              <a:t>12/10/21</a:t>
             </a:fld>
             <a:endParaRPr lang="en-US"/>
           </a:p>
@@ -2393,7 +2404,7 @@
           <a:p>
             <a:fld id="{F824BB33-C0D3-F347-9F38-B235B62BC7C3}" type="datetimeFigureOut">
               <a:rPr lang="en-US" smtClean="0"/>
-              <a:t>12/9/21</a:t>
+              <a:t>12/10/21</a:t>
             </a:fld>
             <a:endParaRPr lang="en-US"/>
           </a:p>
@@ -2681,7 +2692,7 @@
           <a:p>
             <a:fld id="{F824BB33-C0D3-F347-9F38-B235B62BC7C3}" type="datetimeFigureOut">
               <a:rPr lang="en-US" smtClean="0"/>
-              <a:t>12/9/21</a:t>
+              <a:t>12/10/21</a:t>
             </a:fld>
             <a:endParaRPr lang="en-US"/>
           </a:p>
@@ -2922,7 +2933,7 @@
           <a:p>
             <a:fld id="{F824BB33-C0D3-F347-9F38-B235B62BC7C3}" type="datetimeFigureOut">
               <a:rPr lang="en-US" smtClean="0"/>
-              <a:t>12/9/21</a:t>
+              <a:t>12/10/21</a:t>
             </a:fld>
             <a:endParaRPr lang="en-US"/>
           </a:p>
@@ -4432,6 +4443,348 @@
                 <a:latin typeface="Times New Roman" panose="02020603050405020304" pitchFamily="18" charset="0"/>
                 <a:cs typeface="Times New Roman" panose="02020603050405020304" pitchFamily="18" charset="0"/>
               </a:rPr>
+              <a:t>Block Design &amp; HW Utilization</a:t>
+            </a:r>
+            <a:endParaRPr lang="en-US" dirty="0"/>
+          </a:p>
+        </p:txBody>
+      </p:sp>
+      <p:pic>
+        <p:nvPicPr>
+          <p:cNvPr id="4" name="Content Placeholder 3">
+            <a:extLst>
+              <a:ext uri="{FF2B5EF4-FFF2-40B4-BE49-F238E27FC236}">
+                <a16:creationId xmlns:a16="http://schemas.microsoft.com/office/drawing/2014/main" id="{A7888AD3-3D60-9E4B-8EB2-E5D173B63B34}"/>
+              </a:ext>
+            </a:extLst>
+          </p:cNvPr>
+          <p:cNvPicPr>
+            <a:picLocks noGrp="1" noChangeAspect="1"/>
+          </p:cNvPicPr>
+          <p:nvPr>
+            <p:ph idx="1"/>
+          </p:nvPr>
+        </p:nvPicPr>
+        <p:blipFill>
+          <a:blip r:embed="rId2"/>
+          <a:stretch>
+            <a:fillRect/>
+          </a:stretch>
+        </p:blipFill>
+        <p:spPr>
+          <a:xfrm>
+            <a:off x="1590961" y="2119723"/>
+            <a:ext cx="9010078" cy="2618554"/>
+          </a:xfrm>
+          <a:prstGeom prst="rect">
+            <a:avLst/>
+          </a:prstGeom>
+        </p:spPr>
+      </p:pic>
+    </p:spTree>
+    <p:extLst>
+      <p:ext uri="{BB962C8B-B14F-4D97-AF65-F5344CB8AC3E}">
+        <p14:creationId xmlns:p14="http://schemas.microsoft.com/office/powerpoint/2010/main" val="2595640824"/>
+      </p:ext>
+    </p:extLst>
+  </p:cSld>
+  <p:clrMapOvr>
+    <a:masterClrMapping/>
+  </p:clrMapOvr>
+</p:sld>
+</file>
+
+<file path=ppt/slides/slide16.xml><?xml version="1.0" encoding="utf-8"?>
+<p:sld xmlns:a="http://schemas.openxmlformats.org/drawingml/2006/main" xmlns:r="http://schemas.openxmlformats.org/officeDocument/2006/relationships" xmlns:p="http://schemas.openxmlformats.org/presentationml/2006/main">
+  <p:cSld>
+    <p:spTree>
+      <p:nvGrpSpPr>
+        <p:cNvPr id="1" name=""/>
+        <p:cNvGrpSpPr/>
+        <p:nvPr/>
+      </p:nvGrpSpPr>
+      <p:grpSpPr>
+        <a:xfrm>
+          <a:off x="0" y="0"/>
+          <a:ext cx="0" cy="0"/>
+          <a:chOff x="0" y="0"/>
+          <a:chExt cx="0" cy="0"/>
+        </a:xfrm>
+      </p:grpSpPr>
+      <p:sp>
+        <p:nvSpPr>
+          <p:cNvPr id="2" name="Title 1">
+            <a:extLst>
+              <a:ext uri="{FF2B5EF4-FFF2-40B4-BE49-F238E27FC236}">
+                <a16:creationId xmlns:a16="http://schemas.microsoft.com/office/drawing/2014/main" id="{3661B22C-06BA-4F45-9A0F-B231C6246026}"/>
+              </a:ext>
+            </a:extLst>
+          </p:cNvPr>
+          <p:cNvSpPr>
+            <a:spLocks noGrp="1"/>
+          </p:cNvSpPr>
+          <p:nvPr>
+            <p:ph type="title"/>
+          </p:nvPr>
+        </p:nvSpPr>
+        <p:spPr/>
+        <p:txBody>
+          <a:bodyPr/>
+          <a:lstStyle/>
+          <a:p>
+            <a:r>
+              <a:rPr lang="en-US" i="1" dirty="0">
+                <a:latin typeface="Times New Roman" panose="02020603050405020304" pitchFamily="18" charset="0"/>
+                <a:cs typeface="Times New Roman" panose="02020603050405020304" pitchFamily="18" charset="0"/>
+              </a:rPr>
+              <a:t>Kernel &amp; Post Synthesis Utilization</a:t>
+            </a:r>
+            <a:endParaRPr lang="en-US" dirty="0"/>
+          </a:p>
+        </p:txBody>
+      </p:sp>
+      <p:pic>
+        <p:nvPicPr>
+          <p:cNvPr id="6" name="Picture 5">
+            <a:extLst>
+              <a:ext uri="{FF2B5EF4-FFF2-40B4-BE49-F238E27FC236}">
+                <a16:creationId xmlns:a16="http://schemas.microsoft.com/office/drawing/2014/main" id="{9615625A-1022-4344-8E60-564757C72DCC}"/>
+              </a:ext>
+            </a:extLst>
+          </p:cNvPr>
+          <p:cNvPicPr>
+            <a:picLocks noChangeAspect="1"/>
+          </p:cNvPicPr>
+          <p:nvPr/>
+        </p:nvPicPr>
+        <p:blipFill>
+          <a:blip r:embed="rId2"/>
+          <a:stretch>
+            <a:fillRect/>
+          </a:stretch>
+        </p:blipFill>
+        <p:spPr>
+          <a:xfrm>
+            <a:off x="2852398" y="1690688"/>
+            <a:ext cx="6071039" cy="2090030"/>
+          </a:xfrm>
+          <a:prstGeom prst="rect">
+            <a:avLst/>
+          </a:prstGeom>
+        </p:spPr>
+      </p:pic>
+      <p:pic>
+        <p:nvPicPr>
+          <p:cNvPr id="7" name="Picture 6">
+            <a:extLst>
+              <a:ext uri="{FF2B5EF4-FFF2-40B4-BE49-F238E27FC236}">
+                <a16:creationId xmlns:a16="http://schemas.microsoft.com/office/drawing/2014/main" id="{9C5C06F9-56F6-1042-AEFD-C3EFC9D3AEBC}"/>
+              </a:ext>
+            </a:extLst>
+          </p:cNvPr>
+          <p:cNvPicPr>
+            <a:picLocks noChangeAspect="1"/>
+          </p:cNvPicPr>
+          <p:nvPr/>
+        </p:nvPicPr>
+        <p:blipFill>
+          <a:blip r:embed="rId3"/>
+          <a:stretch>
+            <a:fillRect/>
+          </a:stretch>
+        </p:blipFill>
+        <p:spPr>
+          <a:xfrm>
+            <a:off x="2652856" y="3910086"/>
+            <a:ext cx="6470124" cy="2141358"/>
+          </a:xfrm>
+          <a:prstGeom prst="rect">
+            <a:avLst/>
+          </a:prstGeom>
+        </p:spPr>
+      </p:pic>
+    </p:spTree>
+    <p:extLst>
+      <p:ext uri="{BB962C8B-B14F-4D97-AF65-F5344CB8AC3E}">
+        <p14:creationId xmlns:p14="http://schemas.microsoft.com/office/powerpoint/2010/main" val="4106834017"/>
+      </p:ext>
+    </p:extLst>
+  </p:cSld>
+  <p:clrMapOvr>
+    <a:masterClrMapping/>
+  </p:clrMapOvr>
+</p:sld>
+</file>
+
+<file path=ppt/slides/slide17.xml><?xml version="1.0" encoding="utf-8"?>
+<p:sld xmlns:a="http://schemas.openxmlformats.org/drawingml/2006/main" xmlns:r="http://schemas.openxmlformats.org/officeDocument/2006/relationships" xmlns:p="http://schemas.openxmlformats.org/presentationml/2006/main">
+  <p:cSld>
+    <p:spTree>
+      <p:nvGrpSpPr>
+        <p:cNvPr id="1" name=""/>
+        <p:cNvGrpSpPr/>
+        <p:nvPr/>
+      </p:nvGrpSpPr>
+      <p:grpSpPr>
+        <a:xfrm>
+          <a:off x="0" y="0"/>
+          <a:ext cx="0" cy="0"/>
+          <a:chOff x="0" y="0"/>
+          <a:chExt cx="0" cy="0"/>
+        </a:xfrm>
+      </p:grpSpPr>
+      <p:sp>
+        <p:nvSpPr>
+          <p:cNvPr id="2" name="Title 1">
+            <a:extLst>
+              <a:ext uri="{FF2B5EF4-FFF2-40B4-BE49-F238E27FC236}">
+                <a16:creationId xmlns:a16="http://schemas.microsoft.com/office/drawing/2014/main" id="{3661B22C-06BA-4F45-9A0F-B231C6246026}"/>
+              </a:ext>
+            </a:extLst>
+          </p:cNvPr>
+          <p:cNvSpPr>
+            <a:spLocks noGrp="1"/>
+          </p:cNvSpPr>
+          <p:nvPr>
+            <p:ph type="title"/>
+          </p:nvPr>
+        </p:nvSpPr>
+        <p:spPr>
+          <a:xfrm>
+            <a:off x="1831563" y="2318530"/>
+            <a:ext cx="3024216" cy="2220939"/>
+          </a:xfrm>
+        </p:spPr>
+        <p:txBody>
+          <a:bodyPr>
+            <a:normAutofit/>
+          </a:bodyPr>
+          <a:lstStyle/>
+          <a:p>
+            <a:pPr algn="ctr"/>
+            <a:r>
+              <a:rPr lang="en-US" i="1" dirty="0">
+                <a:latin typeface="Times New Roman" panose="02020603050405020304" pitchFamily="18" charset="0"/>
+                <a:cs typeface="Times New Roman" panose="02020603050405020304" pitchFamily="18" charset="0"/>
+              </a:rPr>
+              <a:t>FPGA</a:t>
+            </a:r>
+            <a:br>
+              <a:rPr lang="en-US" i="1" dirty="0">
+                <a:latin typeface="Times New Roman" panose="02020603050405020304" pitchFamily="18" charset="0"/>
+                <a:cs typeface="Times New Roman" panose="02020603050405020304" pitchFamily="18" charset="0"/>
+              </a:rPr>
+            </a:br>
+            <a:r>
+              <a:rPr lang="en-US" i="1" dirty="0">
+                <a:latin typeface="Times New Roman" panose="02020603050405020304" pitchFamily="18" charset="0"/>
+                <a:cs typeface="Times New Roman" panose="02020603050405020304" pitchFamily="18" charset="0"/>
+              </a:rPr>
+              <a:t>Dye</a:t>
+            </a:r>
+            <a:br>
+              <a:rPr lang="en-US" i="1" dirty="0">
+                <a:latin typeface="Times New Roman" panose="02020603050405020304" pitchFamily="18" charset="0"/>
+                <a:cs typeface="Times New Roman" panose="02020603050405020304" pitchFamily="18" charset="0"/>
+              </a:rPr>
+            </a:br>
+            <a:r>
+              <a:rPr lang="en-US" i="1" dirty="0">
+                <a:latin typeface="Times New Roman" panose="02020603050405020304" pitchFamily="18" charset="0"/>
+                <a:cs typeface="Times New Roman" panose="02020603050405020304" pitchFamily="18" charset="0"/>
+              </a:rPr>
+              <a:t>Utilization</a:t>
+            </a:r>
+            <a:endParaRPr lang="en-US" dirty="0"/>
+          </a:p>
+        </p:txBody>
+      </p:sp>
+      <p:pic>
+        <p:nvPicPr>
+          <p:cNvPr id="4" name="Picture 3">
+            <a:extLst>
+              <a:ext uri="{FF2B5EF4-FFF2-40B4-BE49-F238E27FC236}">
+                <a16:creationId xmlns:a16="http://schemas.microsoft.com/office/drawing/2014/main" id="{06118C24-588F-5142-B862-5FC690021685}"/>
+              </a:ext>
+            </a:extLst>
+          </p:cNvPr>
+          <p:cNvPicPr>
+            <a:picLocks noChangeAspect="1"/>
+          </p:cNvPicPr>
+          <p:nvPr/>
+        </p:nvPicPr>
+        <p:blipFill>
+          <a:blip r:embed="rId2"/>
+          <a:stretch>
+            <a:fillRect/>
+          </a:stretch>
+        </p:blipFill>
+        <p:spPr>
+          <a:xfrm>
+            <a:off x="5652636" y="256604"/>
+            <a:ext cx="6402730" cy="6344787"/>
+          </a:xfrm>
+          <a:prstGeom prst="rect">
+            <a:avLst/>
+          </a:prstGeom>
+        </p:spPr>
+      </p:pic>
+    </p:spTree>
+    <p:extLst>
+      <p:ext uri="{BB962C8B-B14F-4D97-AF65-F5344CB8AC3E}">
+        <p14:creationId xmlns:p14="http://schemas.microsoft.com/office/powerpoint/2010/main" val="2246092227"/>
+      </p:ext>
+    </p:extLst>
+  </p:cSld>
+  <p:clrMapOvr>
+    <a:masterClrMapping/>
+  </p:clrMapOvr>
+</p:sld>
+</file>
+
+<file path=ppt/slides/slide18.xml><?xml version="1.0" encoding="utf-8"?>
+<p:sld xmlns:a="http://schemas.openxmlformats.org/drawingml/2006/main" xmlns:r="http://schemas.openxmlformats.org/officeDocument/2006/relationships" xmlns:p="http://schemas.openxmlformats.org/presentationml/2006/main">
+  <p:cSld>
+    <p:spTree>
+      <p:nvGrpSpPr>
+        <p:cNvPr id="1" name=""/>
+        <p:cNvGrpSpPr/>
+        <p:nvPr/>
+      </p:nvGrpSpPr>
+      <p:grpSpPr>
+        <a:xfrm>
+          <a:off x="0" y="0"/>
+          <a:ext cx="0" cy="0"/>
+          <a:chOff x="0" y="0"/>
+          <a:chExt cx="0" cy="0"/>
+        </a:xfrm>
+      </p:grpSpPr>
+      <p:sp>
+        <p:nvSpPr>
+          <p:cNvPr id="2" name="Title 1">
+            <a:extLst>
+              <a:ext uri="{FF2B5EF4-FFF2-40B4-BE49-F238E27FC236}">
+                <a16:creationId xmlns:a16="http://schemas.microsoft.com/office/drawing/2014/main" id="{3661B22C-06BA-4F45-9A0F-B231C6246026}"/>
+              </a:ext>
+            </a:extLst>
+          </p:cNvPr>
+          <p:cNvSpPr>
+            <a:spLocks noGrp="1"/>
+          </p:cNvSpPr>
+          <p:nvPr>
+            <p:ph type="title"/>
+          </p:nvPr>
+        </p:nvSpPr>
+        <p:spPr/>
+        <p:txBody>
+          <a:bodyPr/>
+          <a:lstStyle/>
+          <a:p>
+            <a:r>
+              <a:rPr lang="en-US" i="1" dirty="0">
+                <a:latin typeface="Times New Roman" panose="02020603050405020304" pitchFamily="18" charset="0"/>
+                <a:cs typeface="Times New Roman" panose="02020603050405020304" pitchFamily="18" charset="0"/>
+              </a:rPr>
               <a:t>Roofline Analysis (Basic vs Improved)</a:t>
             </a:r>
             <a:endParaRPr lang="en-US" dirty="0"/>
@@ -5012,7 +5365,7 @@
 </p:sld>
 </file>
 
-<file path=ppt/slides/slide16.xml><?xml version="1.0" encoding="utf-8"?>
+<file path=ppt/slides/slide19.xml><?xml version="1.0" encoding="utf-8"?>
 <p:sld xmlns:a="http://schemas.openxmlformats.org/drawingml/2006/main" xmlns:r="http://schemas.openxmlformats.org/officeDocument/2006/relationships" xmlns:p="http://schemas.openxmlformats.org/presentationml/2006/main">
   <p:cSld>
     <p:spTree>
@@ -5302,378 +5655,6 @@
     <p:extLst>
       <p:ext uri="{BB962C8B-B14F-4D97-AF65-F5344CB8AC3E}">
         <p14:creationId xmlns:p14="http://schemas.microsoft.com/office/powerpoint/2010/main" val="3591927531"/>
-      </p:ext>
-    </p:extLst>
-  </p:cSld>
-  <p:clrMapOvr>
-    <a:masterClrMapping/>
-  </p:clrMapOvr>
-</p:sld>
-</file>
-
-<file path=ppt/slides/slide17.xml><?xml version="1.0" encoding="utf-8"?>
-<p:sld xmlns:a="http://schemas.openxmlformats.org/drawingml/2006/main" xmlns:r="http://schemas.openxmlformats.org/officeDocument/2006/relationships" xmlns:p="http://schemas.openxmlformats.org/presentationml/2006/main">
-  <p:cSld>
-    <p:spTree>
-      <p:nvGrpSpPr>
-        <p:cNvPr id="1" name=""/>
-        <p:cNvGrpSpPr/>
-        <p:nvPr/>
-      </p:nvGrpSpPr>
-      <p:grpSpPr>
-        <a:xfrm>
-          <a:off x="0" y="0"/>
-          <a:ext cx="0" cy="0"/>
-          <a:chOff x="0" y="0"/>
-          <a:chExt cx="0" cy="0"/>
-        </a:xfrm>
-      </p:grpSpPr>
-      <p:sp>
-        <p:nvSpPr>
-          <p:cNvPr id="2" name="Title 1">
-            <a:extLst>
-              <a:ext uri="{FF2B5EF4-FFF2-40B4-BE49-F238E27FC236}">
-                <a16:creationId xmlns:a16="http://schemas.microsoft.com/office/drawing/2014/main" id="{3661B22C-06BA-4F45-9A0F-B231C6246026}"/>
-              </a:ext>
-            </a:extLst>
-          </p:cNvPr>
-          <p:cNvSpPr>
-            <a:spLocks noGrp="1"/>
-          </p:cNvSpPr>
-          <p:nvPr>
-            <p:ph type="title"/>
-          </p:nvPr>
-        </p:nvSpPr>
-        <p:spPr/>
-        <p:txBody>
-          <a:bodyPr/>
-          <a:lstStyle/>
-          <a:p>
-            <a:r>
-              <a:rPr lang="en-US" i="1" dirty="0">
-                <a:latin typeface="Times New Roman" panose="02020603050405020304" pitchFamily="18" charset="0"/>
-                <a:cs typeface="Times New Roman" panose="02020603050405020304" pitchFamily="18" charset="0"/>
-              </a:rPr>
-              <a:t>Further Optimization Ideas</a:t>
-            </a:r>
-            <a:endParaRPr lang="en-US" dirty="0"/>
-          </a:p>
-        </p:txBody>
-      </p:sp>
-      <p:sp>
-        <p:nvSpPr>
-          <p:cNvPr id="3" name="Content Placeholder 2">
-            <a:extLst>
-              <a:ext uri="{FF2B5EF4-FFF2-40B4-BE49-F238E27FC236}">
-                <a16:creationId xmlns:a16="http://schemas.microsoft.com/office/drawing/2014/main" id="{7DC0E732-7DDD-E546-A771-FE7125378233}"/>
-              </a:ext>
-            </a:extLst>
-          </p:cNvPr>
-          <p:cNvSpPr>
-            <a:spLocks noGrp="1"/>
-          </p:cNvSpPr>
-          <p:nvPr>
-            <p:ph idx="1"/>
-          </p:nvPr>
-        </p:nvSpPr>
-        <p:spPr/>
-        <p:txBody>
-          <a:bodyPr>
-            <a:normAutofit/>
-          </a:bodyPr>
-          <a:lstStyle/>
-          <a:p>
-            <a:r>
-              <a:rPr lang="en-US" sz="2000" i="1" dirty="0">
-                <a:latin typeface="Times New Roman" panose="02020603050405020304" pitchFamily="18" charset="0"/>
-                <a:cs typeface="Times New Roman" panose="02020603050405020304" pitchFamily="18" charset="0"/>
-              </a:rPr>
-              <a:t>We can improve the performance &amp; the run-times further by splitting the kernel into two different kernels.</a:t>
-            </a:r>
-          </a:p>
-          <a:p>
-            <a:endParaRPr lang="en-US" sz="2000" i="1" dirty="0">
-              <a:latin typeface="Times New Roman" panose="02020603050405020304" pitchFamily="18" charset="0"/>
-              <a:cs typeface="Times New Roman" panose="02020603050405020304" pitchFamily="18" charset="0"/>
-            </a:endParaRPr>
-          </a:p>
-          <a:p>
-            <a:r>
-              <a:rPr lang="en-US" sz="2000" i="1" dirty="0">
-                <a:latin typeface="Times New Roman" panose="02020603050405020304" pitchFamily="18" charset="0"/>
-                <a:cs typeface="Times New Roman" panose="02020603050405020304" pitchFamily="18" charset="0"/>
-              </a:rPr>
-              <a:t>1</a:t>
-            </a:r>
-            <a:r>
-              <a:rPr lang="en-US" sz="2000" i="1" baseline="30000" dirty="0">
-                <a:latin typeface="Times New Roman" panose="02020603050405020304" pitchFamily="18" charset="0"/>
-                <a:cs typeface="Times New Roman" panose="02020603050405020304" pitchFamily="18" charset="0"/>
-              </a:rPr>
-              <a:t>st</a:t>
-            </a:r>
-            <a:r>
-              <a:rPr lang="en-US" sz="2000" i="1" dirty="0">
-                <a:latin typeface="Times New Roman" panose="02020603050405020304" pitchFamily="18" charset="0"/>
-                <a:cs typeface="Times New Roman" panose="02020603050405020304" pitchFamily="18" charset="0"/>
-              </a:rPr>
-              <a:t> kernel to compute the integral image and pipeline it to 2</a:t>
-            </a:r>
-            <a:r>
-              <a:rPr lang="en-US" sz="2000" i="1" baseline="30000" dirty="0">
-                <a:latin typeface="Times New Roman" panose="02020603050405020304" pitchFamily="18" charset="0"/>
-                <a:cs typeface="Times New Roman" panose="02020603050405020304" pitchFamily="18" charset="0"/>
-              </a:rPr>
-              <a:t>nd</a:t>
-            </a:r>
-            <a:r>
-              <a:rPr lang="en-US" sz="2000" i="1" dirty="0">
-                <a:latin typeface="Times New Roman" panose="02020603050405020304" pitchFamily="18" charset="0"/>
-                <a:cs typeface="Times New Roman" panose="02020603050405020304" pitchFamily="18" charset="0"/>
-              </a:rPr>
-              <a:t> kernel to compute the adaptive threshold.</a:t>
-            </a:r>
-          </a:p>
-          <a:p>
-            <a:endParaRPr lang="en-US" sz="2000" i="1" dirty="0">
-              <a:latin typeface="Times New Roman" panose="02020603050405020304" pitchFamily="18" charset="0"/>
-              <a:cs typeface="Times New Roman" panose="02020603050405020304" pitchFamily="18" charset="0"/>
-            </a:endParaRPr>
-          </a:p>
-          <a:p>
-            <a:r>
-              <a:rPr lang="en-US" sz="2000" i="1" dirty="0">
-                <a:latin typeface="Times New Roman" panose="02020603050405020304" pitchFamily="18" charset="0"/>
-                <a:cs typeface="Times New Roman" panose="02020603050405020304" pitchFamily="18" charset="0"/>
-              </a:rPr>
-              <a:t>This approach would be very helpful in practical implementations of live streaming of videos where we need to process the frames continuously.</a:t>
-            </a:r>
-          </a:p>
-          <a:p>
-            <a:endParaRPr lang="en-US" sz="2000" i="1" dirty="0">
-              <a:latin typeface="Times New Roman" panose="02020603050405020304" pitchFamily="18" charset="0"/>
-              <a:cs typeface="Times New Roman" panose="02020603050405020304" pitchFamily="18" charset="0"/>
-            </a:endParaRPr>
-          </a:p>
-        </p:txBody>
-      </p:sp>
-    </p:spTree>
-    <p:extLst>
-      <p:ext uri="{BB962C8B-B14F-4D97-AF65-F5344CB8AC3E}">
-        <p14:creationId xmlns:p14="http://schemas.microsoft.com/office/powerpoint/2010/main" val="369585823"/>
-      </p:ext>
-    </p:extLst>
-  </p:cSld>
-  <p:clrMapOvr>
-    <a:masterClrMapping/>
-  </p:clrMapOvr>
-</p:sld>
-</file>
-
-<file path=ppt/slides/slide18.xml><?xml version="1.0" encoding="utf-8"?>
-<p:sld xmlns:a="http://schemas.openxmlformats.org/drawingml/2006/main" xmlns:r="http://schemas.openxmlformats.org/officeDocument/2006/relationships" xmlns:p="http://schemas.openxmlformats.org/presentationml/2006/main">
-  <p:cSld>
-    <p:spTree>
-      <p:nvGrpSpPr>
-        <p:cNvPr id="1" name=""/>
-        <p:cNvGrpSpPr/>
-        <p:nvPr/>
-      </p:nvGrpSpPr>
-      <p:grpSpPr>
-        <a:xfrm>
-          <a:off x="0" y="0"/>
-          <a:ext cx="0" cy="0"/>
-          <a:chOff x="0" y="0"/>
-          <a:chExt cx="0" cy="0"/>
-        </a:xfrm>
-      </p:grpSpPr>
-      <p:pic>
-        <p:nvPicPr>
-          <p:cNvPr id="6" name="Picture 5">
-            <a:extLst>
-              <a:ext uri="{FF2B5EF4-FFF2-40B4-BE49-F238E27FC236}">
-                <a16:creationId xmlns:a16="http://schemas.microsoft.com/office/drawing/2014/main" id="{06BBF5A5-E9B6-1346-B642-BCCC4B313E16}"/>
-              </a:ext>
-            </a:extLst>
-          </p:cNvPr>
-          <p:cNvPicPr>
-            <a:picLocks noChangeAspect="1"/>
-          </p:cNvPicPr>
-          <p:nvPr/>
-        </p:nvPicPr>
-        <p:blipFill>
-          <a:blip r:embed="rId2"/>
-          <a:stretch>
-            <a:fillRect/>
-          </a:stretch>
-        </p:blipFill>
-        <p:spPr>
-          <a:xfrm>
-            <a:off x="853440" y="319062"/>
-            <a:ext cx="4343400" cy="4185627"/>
-          </a:xfrm>
-          <a:prstGeom prst="rect">
-            <a:avLst/>
-          </a:prstGeom>
-        </p:spPr>
-      </p:pic>
-      <p:sp>
-        <p:nvSpPr>
-          <p:cNvPr id="7" name="TextBox 6">
-            <a:extLst>
-              <a:ext uri="{FF2B5EF4-FFF2-40B4-BE49-F238E27FC236}">
-                <a16:creationId xmlns:a16="http://schemas.microsoft.com/office/drawing/2014/main" id="{C3CEBA7C-CE19-4244-9E6A-E430B7595190}"/>
-              </a:ext>
-            </a:extLst>
-          </p:cNvPr>
-          <p:cNvSpPr txBox="1"/>
-          <p:nvPr/>
-        </p:nvSpPr>
-        <p:spPr>
-          <a:xfrm>
-            <a:off x="6441440" y="3677920"/>
-            <a:ext cx="2001520" cy="523220"/>
-          </a:xfrm>
-          <a:prstGeom prst="rect">
-            <a:avLst/>
-          </a:prstGeom>
-          <a:noFill/>
-        </p:spPr>
-        <p:txBody>
-          <a:bodyPr wrap="square" rtlCol="0">
-            <a:spAutoFit/>
-          </a:bodyPr>
-          <a:lstStyle/>
-          <a:p>
-            <a:r>
-              <a:rPr lang="en-US" sz="2800" i="1" dirty="0">
-                <a:latin typeface="Times New Roman" panose="02020603050405020304" pitchFamily="18" charset="0"/>
-                <a:cs typeface="Times New Roman" panose="02020603050405020304" pitchFamily="18" charset="0"/>
-              </a:rPr>
-              <a:t>Questions ?</a:t>
-            </a:r>
-          </a:p>
-        </p:txBody>
-      </p:sp>
-    </p:spTree>
-    <p:extLst>
-      <p:ext uri="{BB962C8B-B14F-4D97-AF65-F5344CB8AC3E}">
-        <p14:creationId xmlns:p14="http://schemas.microsoft.com/office/powerpoint/2010/main" val="3265938487"/>
-      </p:ext>
-    </p:extLst>
-  </p:cSld>
-  <p:clrMapOvr>
-    <a:masterClrMapping/>
-  </p:clrMapOvr>
-</p:sld>
-</file>
-
-<file path=ppt/slides/slide19.xml><?xml version="1.0" encoding="utf-8"?>
-<p:sld xmlns:a="http://schemas.openxmlformats.org/drawingml/2006/main" xmlns:r="http://schemas.openxmlformats.org/officeDocument/2006/relationships" xmlns:p="http://schemas.openxmlformats.org/presentationml/2006/main">
-  <p:cSld>
-    <p:spTree>
-      <p:nvGrpSpPr>
-        <p:cNvPr id="1" name=""/>
-        <p:cNvGrpSpPr/>
-        <p:nvPr/>
-      </p:nvGrpSpPr>
-      <p:grpSpPr>
-        <a:xfrm>
-          <a:off x="0" y="0"/>
-          <a:ext cx="0" cy="0"/>
-          <a:chOff x="0" y="0"/>
-          <a:chExt cx="0" cy="0"/>
-        </a:xfrm>
-      </p:grpSpPr>
-      <p:pic>
-        <p:nvPicPr>
-          <p:cNvPr id="2052" name="Picture 4" descr="Question face topic oil pressure gauge and sending unit question the roush  garage clipart - ClipartBarn">
-            <a:extLst>
-              <a:ext uri="{FF2B5EF4-FFF2-40B4-BE49-F238E27FC236}">
-                <a16:creationId xmlns:a16="http://schemas.microsoft.com/office/drawing/2014/main" id="{A3725295-3CFF-CF4F-969F-B1FA195279C8}"/>
-              </a:ext>
-            </a:extLst>
-          </p:cNvPr>
-          <p:cNvPicPr>
-            <a:picLocks noChangeAspect="1" noChangeArrowheads="1"/>
-          </p:cNvPicPr>
-          <p:nvPr/>
-        </p:nvPicPr>
-        <p:blipFill>
-          <a:blip r:embed="rId2">
-            <a:extLst>
-              <a:ext uri="{28A0092B-C50C-407E-A947-70E740481C1C}">
-                <a14:useLocalDpi xmlns:a14="http://schemas.microsoft.com/office/drawing/2010/main" val="0"/>
-              </a:ext>
-            </a:extLst>
-          </a:blip>
-          <a:srcRect/>
-          <a:stretch>
-            <a:fillRect/>
-          </a:stretch>
-        </p:blipFill>
-        <p:spPr bwMode="auto">
-          <a:xfrm>
-            <a:off x="2094230" y="1158250"/>
-            <a:ext cx="5271770" cy="3208903"/>
-          </a:xfrm>
-          <a:prstGeom prst="rect">
-            <a:avLst/>
-          </a:prstGeom>
-          <a:noFill/>
-          <a:extLst>
-            <a:ext uri="{909E8E84-426E-40DD-AFC4-6F175D3DCCD1}">
-              <a14:hiddenFill xmlns:a14="http://schemas.microsoft.com/office/drawing/2010/main">
-                <a:solidFill>
-                  <a:srgbClr val="FFFFFF"/>
-                </a:solidFill>
-              </a14:hiddenFill>
-            </a:ext>
-          </a:extLst>
-        </p:spPr>
-      </p:pic>
-      <p:sp>
-        <p:nvSpPr>
-          <p:cNvPr id="6" name="TextBox 5">
-            <a:extLst>
-              <a:ext uri="{FF2B5EF4-FFF2-40B4-BE49-F238E27FC236}">
-                <a16:creationId xmlns:a16="http://schemas.microsoft.com/office/drawing/2014/main" id="{A68D4098-01AC-2440-9D48-29B74C2919AB}"/>
-              </a:ext>
-            </a:extLst>
-          </p:cNvPr>
-          <p:cNvSpPr txBox="1"/>
-          <p:nvPr/>
-        </p:nvSpPr>
-        <p:spPr>
-          <a:xfrm>
-            <a:off x="7010400" y="4367153"/>
-            <a:ext cx="2001520" cy="523220"/>
-          </a:xfrm>
-          <a:prstGeom prst="rect">
-            <a:avLst/>
-          </a:prstGeom>
-          <a:noFill/>
-        </p:spPr>
-        <p:txBody>
-          <a:bodyPr wrap="square" rtlCol="0">
-            <a:spAutoFit/>
-          </a:bodyPr>
-          <a:lstStyle/>
-          <a:p>
-            <a:r>
-              <a:rPr lang="en-US" sz="2800" i="1" dirty="0">
-                <a:latin typeface="Times New Roman" panose="02020603050405020304" pitchFamily="18" charset="0"/>
-                <a:cs typeface="Times New Roman" panose="02020603050405020304" pitchFamily="18" charset="0"/>
-              </a:rPr>
-              <a:t>Thank You</a:t>
-            </a:r>
-          </a:p>
-        </p:txBody>
-      </p:sp>
-    </p:spTree>
-    <p:extLst>
-      <p:ext uri="{BB962C8B-B14F-4D97-AF65-F5344CB8AC3E}">
-        <p14:creationId xmlns:p14="http://schemas.microsoft.com/office/powerpoint/2010/main" val="4014568532"/>
       </p:ext>
     </p:extLst>
   </p:cSld>
@@ -5859,6 +5840,579 @@
 </p:sld>
 </file>
 
+<file path=ppt/slides/slide20.xml><?xml version="1.0" encoding="utf-8"?>
+<p:sld xmlns:a="http://schemas.openxmlformats.org/drawingml/2006/main" xmlns:r="http://schemas.openxmlformats.org/officeDocument/2006/relationships" xmlns:p="http://schemas.openxmlformats.org/presentationml/2006/main">
+  <p:cSld>
+    <p:spTree>
+      <p:nvGrpSpPr>
+        <p:cNvPr id="1" name=""/>
+        <p:cNvGrpSpPr/>
+        <p:nvPr/>
+      </p:nvGrpSpPr>
+      <p:grpSpPr>
+        <a:xfrm>
+          <a:off x="0" y="0"/>
+          <a:ext cx="0" cy="0"/>
+          <a:chOff x="0" y="0"/>
+          <a:chExt cx="0" cy="0"/>
+        </a:xfrm>
+      </p:grpSpPr>
+      <p:sp>
+        <p:nvSpPr>
+          <p:cNvPr id="2" name="Title 1">
+            <a:extLst>
+              <a:ext uri="{FF2B5EF4-FFF2-40B4-BE49-F238E27FC236}">
+                <a16:creationId xmlns:a16="http://schemas.microsoft.com/office/drawing/2014/main" id="{3661B22C-06BA-4F45-9A0F-B231C6246026}"/>
+              </a:ext>
+            </a:extLst>
+          </p:cNvPr>
+          <p:cNvSpPr>
+            <a:spLocks noGrp="1"/>
+          </p:cNvSpPr>
+          <p:nvPr>
+            <p:ph type="title"/>
+          </p:nvPr>
+        </p:nvSpPr>
+        <p:spPr/>
+        <p:txBody>
+          <a:bodyPr/>
+          <a:lstStyle/>
+          <a:p>
+            <a:r>
+              <a:rPr lang="en-US" i="1" dirty="0">
+                <a:latin typeface="Times New Roman" panose="02020603050405020304" pitchFamily="18" charset="0"/>
+                <a:cs typeface="Times New Roman" panose="02020603050405020304" pitchFamily="18" charset="0"/>
+              </a:rPr>
+              <a:t>Further Optimization Ideas</a:t>
+            </a:r>
+            <a:endParaRPr lang="en-US" dirty="0"/>
+          </a:p>
+        </p:txBody>
+      </p:sp>
+      <p:sp>
+        <p:nvSpPr>
+          <p:cNvPr id="3" name="Content Placeholder 2">
+            <a:extLst>
+              <a:ext uri="{FF2B5EF4-FFF2-40B4-BE49-F238E27FC236}">
+                <a16:creationId xmlns:a16="http://schemas.microsoft.com/office/drawing/2014/main" id="{7DC0E732-7DDD-E546-A771-FE7125378233}"/>
+              </a:ext>
+            </a:extLst>
+          </p:cNvPr>
+          <p:cNvSpPr>
+            <a:spLocks noGrp="1"/>
+          </p:cNvSpPr>
+          <p:nvPr>
+            <p:ph idx="1"/>
+          </p:nvPr>
+        </p:nvSpPr>
+        <p:spPr/>
+        <p:txBody>
+          <a:bodyPr>
+            <a:normAutofit/>
+          </a:bodyPr>
+          <a:lstStyle/>
+          <a:p>
+            <a:r>
+              <a:rPr lang="en-US" sz="2000" i="1" dirty="0">
+                <a:latin typeface="Times New Roman" panose="02020603050405020304" pitchFamily="18" charset="0"/>
+                <a:cs typeface="Times New Roman" panose="02020603050405020304" pitchFamily="18" charset="0"/>
+              </a:rPr>
+              <a:t>We can improve the performance &amp; the run-times further by splitting the kernel into two different kernels.</a:t>
+            </a:r>
+          </a:p>
+          <a:p>
+            <a:endParaRPr lang="en-US" sz="2000" i="1" dirty="0">
+              <a:latin typeface="Times New Roman" panose="02020603050405020304" pitchFamily="18" charset="0"/>
+              <a:cs typeface="Times New Roman" panose="02020603050405020304" pitchFamily="18" charset="0"/>
+            </a:endParaRPr>
+          </a:p>
+          <a:p>
+            <a:r>
+              <a:rPr lang="en-US" sz="2000" i="1" dirty="0">
+                <a:latin typeface="Times New Roman" panose="02020603050405020304" pitchFamily="18" charset="0"/>
+                <a:cs typeface="Times New Roman" panose="02020603050405020304" pitchFamily="18" charset="0"/>
+              </a:rPr>
+              <a:t>1</a:t>
+            </a:r>
+            <a:r>
+              <a:rPr lang="en-US" sz="2000" i="1" baseline="30000" dirty="0">
+                <a:latin typeface="Times New Roman" panose="02020603050405020304" pitchFamily="18" charset="0"/>
+                <a:cs typeface="Times New Roman" panose="02020603050405020304" pitchFamily="18" charset="0"/>
+              </a:rPr>
+              <a:t>st</a:t>
+            </a:r>
+            <a:r>
+              <a:rPr lang="en-US" sz="2000" i="1" dirty="0">
+                <a:latin typeface="Times New Roman" panose="02020603050405020304" pitchFamily="18" charset="0"/>
+                <a:cs typeface="Times New Roman" panose="02020603050405020304" pitchFamily="18" charset="0"/>
+              </a:rPr>
+              <a:t> kernel to compute the integral image and pipeline it to 2</a:t>
+            </a:r>
+            <a:r>
+              <a:rPr lang="en-US" sz="2000" i="1" baseline="30000" dirty="0">
+                <a:latin typeface="Times New Roman" panose="02020603050405020304" pitchFamily="18" charset="0"/>
+                <a:cs typeface="Times New Roman" panose="02020603050405020304" pitchFamily="18" charset="0"/>
+              </a:rPr>
+              <a:t>nd</a:t>
+            </a:r>
+            <a:r>
+              <a:rPr lang="en-US" sz="2000" i="1" dirty="0">
+                <a:latin typeface="Times New Roman" panose="02020603050405020304" pitchFamily="18" charset="0"/>
+                <a:cs typeface="Times New Roman" panose="02020603050405020304" pitchFamily="18" charset="0"/>
+              </a:rPr>
+              <a:t> kernel to compute the adaptive threshold.</a:t>
+            </a:r>
+          </a:p>
+          <a:p>
+            <a:endParaRPr lang="en-US" sz="2000" i="1" dirty="0">
+              <a:latin typeface="Times New Roman" panose="02020603050405020304" pitchFamily="18" charset="0"/>
+              <a:cs typeface="Times New Roman" panose="02020603050405020304" pitchFamily="18" charset="0"/>
+            </a:endParaRPr>
+          </a:p>
+          <a:p>
+            <a:r>
+              <a:rPr lang="en-US" sz="2000" i="1" dirty="0">
+                <a:latin typeface="Times New Roman" panose="02020603050405020304" pitchFamily="18" charset="0"/>
+                <a:cs typeface="Times New Roman" panose="02020603050405020304" pitchFamily="18" charset="0"/>
+              </a:rPr>
+              <a:t>This approach would be very helpful in practical implementations of live streaming of videos where we need to process the frames continuously.</a:t>
+            </a:r>
+          </a:p>
+          <a:p>
+            <a:endParaRPr lang="en-US" sz="2000" i="1" dirty="0">
+              <a:latin typeface="Times New Roman" panose="02020603050405020304" pitchFamily="18" charset="0"/>
+              <a:cs typeface="Times New Roman" panose="02020603050405020304" pitchFamily="18" charset="0"/>
+            </a:endParaRPr>
+          </a:p>
+        </p:txBody>
+      </p:sp>
+    </p:spTree>
+    <p:extLst>
+      <p:ext uri="{BB962C8B-B14F-4D97-AF65-F5344CB8AC3E}">
+        <p14:creationId xmlns:p14="http://schemas.microsoft.com/office/powerpoint/2010/main" val="369585823"/>
+      </p:ext>
+    </p:extLst>
+  </p:cSld>
+  <p:clrMapOvr>
+    <a:masterClrMapping/>
+  </p:clrMapOvr>
+</p:sld>
+</file>
+
+<file path=ppt/slides/slide21.xml><?xml version="1.0" encoding="utf-8"?>
+<p:sld xmlns:a="http://schemas.openxmlformats.org/drawingml/2006/main" xmlns:r="http://schemas.openxmlformats.org/officeDocument/2006/relationships" xmlns:p="http://schemas.openxmlformats.org/presentationml/2006/main">
+  <p:cSld>
+    <p:spTree>
+      <p:nvGrpSpPr>
+        <p:cNvPr id="1" name=""/>
+        <p:cNvGrpSpPr/>
+        <p:nvPr/>
+      </p:nvGrpSpPr>
+      <p:grpSpPr>
+        <a:xfrm>
+          <a:off x="0" y="0"/>
+          <a:ext cx="0" cy="0"/>
+          <a:chOff x="0" y="0"/>
+          <a:chExt cx="0" cy="0"/>
+        </a:xfrm>
+      </p:grpSpPr>
+      <p:sp>
+        <p:nvSpPr>
+          <p:cNvPr id="2" name="Title 1">
+            <a:extLst>
+              <a:ext uri="{FF2B5EF4-FFF2-40B4-BE49-F238E27FC236}">
+                <a16:creationId xmlns:a16="http://schemas.microsoft.com/office/drawing/2014/main" id="{3661B22C-06BA-4F45-9A0F-B231C6246026}"/>
+              </a:ext>
+            </a:extLst>
+          </p:cNvPr>
+          <p:cNvSpPr>
+            <a:spLocks noGrp="1"/>
+          </p:cNvSpPr>
+          <p:nvPr>
+            <p:ph type="title"/>
+          </p:nvPr>
+        </p:nvSpPr>
+        <p:spPr>
+          <a:xfrm>
+            <a:off x="3249667" y="2766218"/>
+            <a:ext cx="5692666" cy="1325563"/>
+          </a:xfrm>
+        </p:spPr>
+        <p:txBody>
+          <a:bodyPr/>
+          <a:lstStyle/>
+          <a:p>
+            <a:r>
+              <a:rPr lang="en-US" i="1" dirty="0">
+                <a:latin typeface="Times New Roman" panose="02020603050405020304" pitchFamily="18" charset="0"/>
+                <a:cs typeface="Times New Roman" panose="02020603050405020304" pitchFamily="18" charset="0"/>
+              </a:rPr>
+              <a:t>Report Walk Through !!!</a:t>
+            </a:r>
+            <a:endParaRPr lang="en-US" dirty="0"/>
+          </a:p>
+        </p:txBody>
+      </p:sp>
+    </p:spTree>
+    <p:extLst>
+      <p:ext uri="{BB962C8B-B14F-4D97-AF65-F5344CB8AC3E}">
+        <p14:creationId xmlns:p14="http://schemas.microsoft.com/office/powerpoint/2010/main" val="1821782330"/>
+      </p:ext>
+    </p:extLst>
+  </p:cSld>
+  <p:clrMapOvr>
+    <a:masterClrMapping/>
+  </p:clrMapOvr>
+</p:sld>
+</file>
+
+<file path=ppt/slides/slide22.xml><?xml version="1.0" encoding="utf-8"?>
+<p:sld xmlns:a="http://schemas.openxmlformats.org/drawingml/2006/main" xmlns:r="http://schemas.openxmlformats.org/officeDocument/2006/relationships" xmlns:p="http://schemas.openxmlformats.org/presentationml/2006/main">
+  <p:cSld>
+    <p:spTree>
+      <p:nvGrpSpPr>
+        <p:cNvPr id="1" name=""/>
+        <p:cNvGrpSpPr/>
+        <p:nvPr/>
+      </p:nvGrpSpPr>
+      <p:grpSpPr>
+        <a:xfrm>
+          <a:off x="0" y="0"/>
+          <a:ext cx="0" cy="0"/>
+          <a:chOff x="0" y="0"/>
+          <a:chExt cx="0" cy="0"/>
+        </a:xfrm>
+      </p:grpSpPr>
+      <p:sp>
+        <p:nvSpPr>
+          <p:cNvPr id="2" name="Title 1">
+            <a:extLst>
+              <a:ext uri="{FF2B5EF4-FFF2-40B4-BE49-F238E27FC236}">
+                <a16:creationId xmlns:a16="http://schemas.microsoft.com/office/drawing/2014/main" id="{3661B22C-06BA-4F45-9A0F-B231C6246026}"/>
+              </a:ext>
+            </a:extLst>
+          </p:cNvPr>
+          <p:cNvSpPr>
+            <a:spLocks noGrp="1"/>
+          </p:cNvSpPr>
+          <p:nvPr>
+            <p:ph type="title"/>
+          </p:nvPr>
+        </p:nvSpPr>
+        <p:spPr>
+          <a:xfrm>
+            <a:off x="3249666" y="2766218"/>
+            <a:ext cx="6945367" cy="1325563"/>
+          </a:xfrm>
+        </p:spPr>
+        <p:txBody>
+          <a:bodyPr/>
+          <a:lstStyle/>
+          <a:p>
+            <a:r>
+              <a:rPr lang="en-US" i="1" dirty="0">
+                <a:latin typeface="Times New Roman" panose="02020603050405020304" pitchFamily="18" charset="0"/>
+                <a:cs typeface="Times New Roman" panose="02020603050405020304" pitchFamily="18" charset="0"/>
+              </a:rPr>
+              <a:t>Repo/Code Walk Through !!!</a:t>
+            </a:r>
+            <a:endParaRPr lang="en-US" dirty="0"/>
+          </a:p>
+        </p:txBody>
+      </p:sp>
+    </p:spTree>
+    <p:extLst>
+      <p:ext uri="{BB962C8B-B14F-4D97-AF65-F5344CB8AC3E}">
+        <p14:creationId xmlns:p14="http://schemas.microsoft.com/office/powerpoint/2010/main" val="285662772"/>
+      </p:ext>
+    </p:extLst>
+  </p:cSld>
+  <p:clrMapOvr>
+    <a:masterClrMapping/>
+  </p:clrMapOvr>
+</p:sld>
+</file>
+
+<file path=ppt/slides/slide23.xml><?xml version="1.0" encoding="utf-8"?>
+<p:sld xmlns:a="http://schemas.openxmlformats.org/drawingml/2006/main" xmlns:r="http://schemas.openxmlformats.org/officeDocument/2006/relationships" xmlns:p="http://schemas.openxmlformats.org/presentationml/2006/main">
+  <p:cSld>
+    <p:spTree>
+      <p:nvGrpSpPr>
+        <p:cNvPr id="1" name=""/>
+        <p:cNvGrpSpPr/>
+        <p:nvPr/>
+      </p:nvGrpSpPr>
+      <p:grpSpPr>
+        <a:xfrm>
+          <a:off x="0" y="0"/>
+          <a:ext cx="0" cy="0"/>
+          <a:chOff x="0" y="0"/>
+          <a:chExt cx="0" cy="0"/>
+        </a:xfrm>
+      </p:grpSpPr>
+      <p:sp>
+        <p:nvSpPr>
+          <p:cNvPr id="2" name="Title 1">
+            <a:extLst>
+              <a:ext uri="{FF2B5EF4-FFF2-40B4-BE49-F238E27FC236}">
+                <a16:creationId xmlns:a16="http://schemas.microsoft.com/office/drawing/2014/main" id="{3661B22C-06BA-4F45-9A0F-B231C6246026}"/>
+              </a:ext>
+            </a:extLst>
+          </p:cNvPr>
+          <p:cNvSpPr>
+            <a:spLocks noGrp="1"/>
+          </p:cNvSpPr>
+          <p:nvPr>
+            <p:ph type="title"/>
+          </p:nvPr>
+        </p:nvSpPr>
+        <p:spPr>
+          <a:xfrm>
+            <a:off x="4445876" y="2766218"/>
+            <a:ext cx="2447925" cy="1325563"/>
+          </a:xfrm>
+        </p:spPr>
+        <p:txBody>
+          <a:bodyPr/>
+          <a:lstStyle/>
+          <a:p>
+            <a:r>
+              <a:rPr lang="en-US" i="1">
+                <a:latin typeface="Times New Roman" panose="02020603050405020304" pitchFamily="18" charset="0"/>
+                <a:cs typeface="Times New Roman" panose="02020603050405020304" pitchFamily="18" charset="0"/>
+              </a:rPr>
+              <a:t>Demo !!!</a:t>
+            </a:r>
+            <a:endParaRPr lang="en-US" dirty="0"/>
+          </a:p>
+        </p:txBody>
+      </p:sp>
+    </p:spTree>
+    <p:extLst>
+      <p:ext uri="{BB962C8B-B14F-4D97-AF65-F5344CB8AC3E}">
+        <p14:creationId xmlns:p14="http://schemas.microsoft.com/office/powerpoint/2010/main" val="1193157568"/>
+      </p:ext>
+    </p:extLst>
+  </p:cSld>
+  <p:clrMapOvr>
+    <a:masterClrMapping/>
+  </p:clrMapOvr>
+</p:sld>
+</file>
+
+<file path=ppt/slides/slide24.xml><?xml version="1.0" encoding="utf-8"?>
+<p:sld xmlns:a="http://schemas.openxmlformats.org/drawingml/2006/main" xmlns:r="http://schemas.openxmlformats.org/officeDocument/2006/relationships" xmlns:p="http://schemas.openxmlformats.org/presentationml/2006/main">
+  <p:cSld>
+    <p:spTree>
+      <p:nvGrpSpPr>
+        <p:cNvPr id="1" name=""/>
+        <p:cNvGrpSpPr/>
+        <p:nvPr/>
+      </p:nvGrpSpPr>
+      <p:grpSpPr>
+        <a:xfrm>
+          <a:off x="0" y="0"/>
+          <a:ext cx="0" cy="0"/>
+          <a:chOff x="0" y="0"/>
+          <a:chExt cx="0" cy="0"/>
+        </a:xfrm>
+      </p:grpSpPr>
+      <p:pic>
+        <p:nvPicPr>
+          <p:cNvPr id="6" name="Picture 5">
+            <a:extLst>
+              <a:ext uri="{FF2B5EF4-FFF2-40B4-BE49-F238E27FC236}">
+                <a16:creationId xmlns:a16="http://schemas.microsoft.com/office/drawing/2014/main" id="{06BBF5A5-E9B6-1346-B642-BCCC4B313E16}"/>
+              </a:ext>
+            </a:extLst>
+          </p:cNvPr>
+          <p:cNvPicPr>
+            <a:picLocks noChangeAspect="1"/>
+          </p:cNvPicPr>
+          <p:nvPr/>
+        </p:nvPicPr>
+        <p:blipFill>
+          <a:blip r:embed="rId2"/>
+          <a:stretch>
+            <a:fillRect/>
+          </a:stretch>
+        </p:blipFill>
+        <p:spPr>
+          <a:xfrm>
+            <a:off x="1914985" y="813048"/>
+            <a:ext cx="4343400" cy="4185627"/>
+          </a:xfrm>
+          <a:prstGeom prst="rect">
+            <a:avLst/>
+          </a:prstGeom>
+        </p:spPr>
+      </p:pic>
+      <p:sp>
+        <p:nvSpPr>
+          <p:cNvPr id="7" name="TextBox 6">
+            <a:extLst>
+              <a:ext uri="{FF2B5EF4-FFF2-40B4-BE49-F238E27FC236}">
+                <a16:creationId xmlns:a16="http://schemas.microsoft.com/office/drawing/2014/main" id="{C3CEBA7C-CE19-4244-9E6A-E430B7595190}"/>
+              </a:ext>
+            </a:extLst>
+          </p:cNvPr>
+          <p:cNvSpPr txBox="1"/>
+          <p:nvPr/>
+        </p:nvSpPr>
+        <p:spPr>
+          <a:xfrm>
+            <a:off x="7996971" y="4634362"/>
+            <a:ext cx="2001520" cy="523220"/>
+          </a:xfrm>
+          <a:prstGeom prst="rect">
+            <a:avLst/>
+          </a:prstGeom>
+          <a:noFill/>
+        </p:spPr>
+        <p:txBody>
+          <a:bodyPr wrap="square" rtlCol="0">
+            <a:spAutoFit/>
+          </a:bodyPr>
+          <a:lstStyle/>
+          <a:p>
+            <a:r>
+              <a:rPr lang="en-US" sz="2800" i="1" dirty="0">
+                <a:latin typeface="Times New Roman" panose="02020603050405020304" pitchFamily="18" charset="0"/>
+                <a:cs typeface="Times New Roman" panose="02020603050405020304" pitchFamily="18" charset="0"/>
+              </a:rPr>
+              <a:t>Questions ?</a:t>
+            </a:r>
+          </a:p>
+        </p:txBody>
+      </p:sp>
+    </p:spTree>
+    <p:extLst>
+      <p:ext uri="{BB962C8B-B14F-4D97-AF65-F5344CB8AC3E}">
+        <p14:creationId xmlns:p14="http://schemas.microsoft.com/office/powerpoint/2010/main" val="3265938487"/>
+      </p:ext>
+    </p:extLst>
+  </p:cSld>
+  <p:clrMapOvr>
+    <a:masterClrMapping/>
+  </p:clrMapOvr>
+</p:sld>
+</file>
+
+<file path=ppt/slides/slide25.xml><?xml version="1.0" encoding="utf-8"?>
+<p:sld xmlns:a="http://schemas.openxmlformats.org/drawingml/2006/main" xmlns:r="http://schemas.openxmlformats.org/officeDocument/2006/relationships" xmlns:p="http://schemas.openxmlformats.org/presentationml/2006/main">
+  <p:cSld>
+    <p:spTree>
+      <p:nvGrpSpPr>
+        <p:cNvPr id="1" name=""/>
+        <p:cNvGrpSpPr/>
+        <p:nvPr/>
+      </p:nvGrpSpPr>
+      <p:grpSpPr>
+        <a:xfrm>
+          <a:off x="0" y="0"/>
+          <a:ext cx="0" cy="0"/>
+          <a:chOff x="0" y="0"/>
+          <a:chExt cx="0" cy="0"/>
+        </a:xfrm>
+      </p:grpSpPr>
+      <p:pic>
+        <p:nvPicPr>
+          <p:cNvPr id="2052" name="Picture 4" descr="Question face topic oil pressure gauge and sending unit question the roush  garage clipart - ClipartBarn">
+            <a:extLst>
+              <a:ext uri="{FF2B5EF4-FFF2-40B4-BE49-F238E27FC236}">
+                <a16:creationId xmlns:a16="http://schemas.microsoft.com/office/drawing/2014/main" id="{A3725295-3CFF-CF4F-969F-B1FA195279C8}"/>
+              </a:ext>
+            </a:extLst>
+          </p:cNvPr>
+          <p:cNvPicPr>
+            <a:picLocks noChangeAspect="1" noChangeArrowheads="1"/>
+          </p:cNvPicPr>
+          <p:nvPr/>
+        </p:nvPicPr>
+        <p:blipFill>
+          <a:blip r:embed="rId2">
+            <a:extLst>
+              <a:ext uri="{28A0092B-C50C-407E-A947-70E740481C1C}">
+                <a14:useLocalDpi xmlns:a14="http://schemas.microsoft.com/office/drawing/2010/main" val="0"/>
+              </a:ext>
+            </a:extLst>
+          </a:blip>
+          <a:srcRect/>
+          <a:stretch>
+            <a:fillRect/>
+          </a:stretch>
+        </p:blipFill>
+        <p:spPr bwMode="auto">
+          <a:xfrm>
+            <a:off x="1316462" y="1263354"/>
+            <a:ext cx="5893381" cy="3587275"/>
+          </a:xfrm>
+          <a:prstGeom prst="rect">
+            <a:avLst/>
+          </a:prstGeom>
+          <a:noFill/>
+          <a:extLst>
+            <a:ext uri="{909E8E84-426E-40DD-AFC4-6F175D3DCCD1}">
+              <a14:hiddenFill xmlns:a14="http://schemas.microsoft.com/office/drawing/2010/main">
+                <a:solidFill>
+                  <a:srgbClr val="FFFFFF"/>
+                </a:solidFill>
+              </a14:hiddenFill>
+            </a:ext>
+          </a:extLst>
+        </p:spPr>
+      </p:pic>
+      <p:sp>
+        <p:nvSpPr>
+          <p:cNvPr id="6" name="TextBox 5">
+            <a:extLst>
+              <a:ext uri="{FF2B5EF4-FFF2-40B4-BE49-F238E27FC236}">
+                <a16:creationId xmlns:a16="http://schemas.microsoft.com/office/drawing/2014/main" id="{A68D4098-01AC-2440-9D48-29B74C2919AB}"/>
+              </a:ext>
+            </a:extLst>
+          </p:cNvPr>
+          <p:cNvSpPr txBox="1"/>
+          <p:nvPr/>
+        </p:nvSpPr>
+        <p:spPr>
+          <a:xfrm>
+            <a:off x="7893269" y="4687836"/>
+            <a:ext cx="2001520" cy="575542"/>
+          </a:xfrm>
+          <a:prstGeom prst="rect">
+            <a:avLst/>
+          </a:prstGeom>
+          <a:noFill/>
+        </p:spPr>
+        <p:txBody>
+          <a:bodyPr wrap="square" rtlCol="0">
+            <a:spAutoFit/>
+          </a:bodyPr>
+          <a:lstStyle/>
+          <a:p>
+            <a:r>
+              <a:rPr lang="en-US" sz="2800" i="1" dirty="0">
+                <a:latin typeface="Times New Roman" panose="02020603050405020304" pitchFamily="18" charset="0"/>
+                <a:cs typeface="Times New Roman" panose="02020603050405020304" pitchFamily="18" charset="0"/>
+              </a:rPr>
+              <a:t>Thank You</a:t>
+            </a:r>
+          </a:p>
+        </p:txBody>
+      </p:sp>
+    </p:spTree>
+    <p:extLst>
+      <p:ext uri="{BB962C8B-B14F-4D97-AF65-F5344CB8AC3E}">
+        <p14:creationId xmlns:p14="http://schemas.microsoft.com/office/powerpoint/2010/main" val="4014568532"/>
+      </p:ext>
+    </p:extLst>
+  </p:cSld>
+  <p:clrMapOvr>
+    <a:masterClrMapping/>
+  </p:clrMapOvr>
+</p:sld>
+</file>
+
 <file path=ppt/slides/slide3.xml><?xml version="1.0" encoding="utf-8"?>
 <p:sld xmlns:a="http://schemas.openxmlformats.org/drawingml/2006/main" xmlns:r="http://schemas.openxmlformats.org/officeDocument/2006/relationships" xmlns:p="http://schemas.openxmlformats.org/presentationml/2006/main">
   <p:cSld>
@@ -5907,8 +6461,8 @@
           </a:p>
         </p:txBody>
       </p:sp>
-      <mc:AlternateContent xmlns:mc="http://schemas.openxmlformats.org/markup-compatibility/2006">
-        <mc:Choice xmlns:a14="http://schemas.microsoft.com/office/drawing/2010/main" Requires="a14">
+      <mc:AlternateContent xmlns:mc="http://schemas.openxmlformats.org/markup-compatibility/2006" xmlns:a14="http://schemas.microsoft.com/office/drawing/2010/main">
+        <mc:Choice Requires="a14">
           <p:sp>
             <p:nvSpPr>
               <p:cNvPr id="3" name="Content Placeholder 2">
@@ -6000,147 +6554,209 @@
                 <a14:m>
                   <m:oMath xmlns:m="http://schemas.openxmlformats.org/officeDocument/2006/math">
                     <m:r>
-                      <a:rPr lang="en-US" sz="2000" i="1"/>
+                      <a:rPr lang="en-US" sz="2000" i="1">
+                        <a:latin typeface="Cambria Math" panose="02040503050406030204" pitchFamily="18" charset="0"/>
+                      </a:rPr>
                       <m:t>𝐼</m:t>
                     </m:r>
                     <m:d>
                       <m:dPr>
                         <m:ctrlPr>
-                          <a:rPr lang="en-IN" sz="2000" i="1"/>
+                          <a:rPr lang="en-IN" sz="2000" i="1">
+                            <a:latin typeface="Cambria Math" panose="02040503050406030204" pitchFamily="18" charset="0"/>
+                          </a:rPr>
                         </m:ctrlPr>
                       </m:dPr>
                       <m:e>
                         <m:r>
-                          <a:rPr lang="en-US" sz="2000" i="1"/>
+                          <a:rPr lang="en-US" sz="2000" i="1">
+                            <a:latin typeface="Cambria Math" panose="02040503050406030204" pitchFamily="18" charset="0"/>
+                          </a:rPr>
                           <m:t>𝑥</m:t>
                         </m:r>
                         <m:r>
-                          <a:rPr lang="en-US" sz="2000" i="1"/>
+                          <a:rPr lang="en-US" sz="2000" i="1">
+                            <a:latin typeface="Cambria Math" panose="02040503050406030204" pitchFamily="18" charset="0"/>
+                          </a:rPr>
                           <m:t>,</m:t>
                         </m:r>
                         <m:r>
-                          <a:rPr lang="en-US" sz="2000" i="1"/>
+                          <a:rPr lang="en-US" sz="2000" i="1">
+                            <a:latin typeface="Cambria Math" panose="02040503050406030204" pitchFamily="18" charset="0"/>
+                          </a:rPr>
                           <m:t>𝑦</m:t>
                         </m:r>
                       </m:e>
                     </m:d>
                     <m:r>
-                      <a:rPr lang="en-US" sz="2000" i="1"/>
+                      <a:rPr lang="en-US" sz="2000" i="1">
+                        <a:latin typeface="Cambria Math" panose="02040503050406030204" pitchFamily="18" charset="0"/>
+                      </a:rPr>
                       <m:t>=</m:t>
                     </m:r>
                     <m:r>
-                      <a:rPr lang="en-US" sz="2000" i="1"/>
+                      <a:rPr lang="en-US" sz="2000" i="1">
+                        <a:latin typeface="Cambria Math" panose="02040503050406030204" pitchFamily="18" charset="0"/>
+                      </a:rPr>
                       <m:t>𝑓</m:t>
                     </m:r>
                     <m:d>
                       <m:dPr>
                         <m:ctrlPr>
-                          <a:rPr lang="en-IN" sz="2000" i="1"/>
+                          <a:rPr lang="en-IN" sz="2000" i="1">
+                            <a:latin typeface="Cambria Math" panose="02040503050406030204" pitchFamily="18" charset="0"/>
+                          </a:rPr>
                         </m:ctrlPr>
                       </m:dPr>
                       <m:e>
                         <m:r>
-                          <a:rPr lang="en-US" sz="2000" i="1"/>
+                          <a:rPr lang="en-US" sz="2000" i="1">
+                            <a:latin typeface="Cambria Math" panose="02040503050406030204" pitchFamily="18" charset="0"/>
+                          </a:rPr>
                           <m:t>𝑥</m:t>
                         </m:r>
                         <m:r>
-                          <a:rPr lang="en-US" sz="2000" i="1"/>
+                          <a:rPr lang="en-US" sz="2000" i="1">
+                            <a:latin typeface="Cambria Math" panose="02040503050406030204" pitchFamily="18" charset="0"/>
+                          </a:rPr>
                           <m:t>,</m:t>
                         </m:r>
                         <m:r>
-                          <a:rPr lang="en-US" sz="2000" i="1"/>
+                          <a:rPr lang="en-US" sz="2000" i="1">
+                            <a:latin typeface="Cambria Math" panose="02040503050406030204" pitchFamily="18" charset="0"/>
+                          </a:rPr>
                           <m:t>𝑦</m:t>
                         </m:r>
                       </m:e>
                     </m:d>
                     <m:r>
-                      <a:rPr lang="en-US" sz="2000" i="1"/>
+                      <a:rPr lang="en-US" sz="2000" i="1">
+                        <a:latin typeface="Cambria Math" panose="02040503050406030204" pitchFamily="18" charset="0"/>
+                      </a:rPr>
                       <m:t>+</m:t>
                     </m:r>
                     <m:r>
-                      <a:rPr lang="en-US" sz="2000" i="1"/>
+                      <a:rPr lang="en-US" sz="2000" i="1">
+                        <a:latin typeface="Cambria Math" panose="02040503050406030204" pitchFamily="18" charset="0"/>
+                      </a:rPr>
                       <m:t>𝐼</m:t>
                     </m:r>
                     <m:d>
                       <m:dPr>
                         <m:ctrlPr>
-                          <a:rPr lang="en-IN" sz="2000" i="1"/>
+                          <a:rPr lang="en-IN" sz="2000" i="1">
+                            <a:latin typeface="Cambria Math" panose="02040503050406030204" pitchFamily="18" charset="0"/>
+                          </a:rPr>
                         </m:ctrlPr>
                       </m:dPr>
                       <m:e>
                         <m:r>
-                          <a:rPr lang="en-US" sz="2000" i="1"/>
+                          <a:rPr lang="en-US" sz="2000" i="1">
+                            <a:latin typeface="Cambria Math" panose="02040503050406030204" pitchFamily="18" charset="0"/>
+                          </a:rPr>
                           <m:t>𝑥</m:t>
                         </m:r>
                         <m:r>
-                          <a:rPr lang="en-US" sz="2000" i="1"/>
+                          <a:rPr lang="en-US" sz="2000" i="1">
+                            <a:latin typeface="Cambria Math" panose="02040503050406030204" pitchFamily="18" charset="0"/>
+                          </a:rPr>
                           <m:t>−1, </m:t>
                         </m:r>
                         <m:r>
-                          <a:rPr lang="en-US" sz="2000" i="1"/>
+                          <a:rPr lang="en-US" sz="2000" i="1">
+                            <a:latin typeface="Cambria Math" panose="02040503050406030204" pitchFamily="18" charset="0"/>
+                          </a:rPr>
                           <m:t>𝑦</m:t>
                         </m:r>
                       </m:e>
                     </m:d>
                     <m:r>
-                      <a:rPr lang="en-US" sz="2000" i="1"/>
+                      <a:rPr lang="en-US" sz="2000" i="1">
+                        <a:latin typeface="Cambria Math" panose="02040503050406030204" pitchFamily="18" charset="0"/>
+                      </a:rPr>
                       <m:t>+</m:t>
                     </m:r>
                     <m:r>
-                      <a:rPr lang="en-US" sz="2000" i="1"/>
+                      <a:rPr lang="en-US" sz="2000" i="1">
+                        <a:latin typeface="Cambria Math" panose="02040503050406030204" pitchFamily="18" charset="0"/>
+                      </a:rPr>
                       <m:t>𝐼</m:t>
                     </m:r>
                     <m:d>
                       <m:dPr>
                         <m:ctrlPr>
-                          <a:rPr lang="en-IN" sz="2000" i="1"/>
+                          <a:rPr lang="en-IN" sz="2000" i="1">
+                            <a:latin typeface="Cambria Math" panose="02040503050406030204" pitchFamily="18" charset="0"/>
+                          </a:rPr>
                         </m:ctrlPr>
                       </m:dPr>
                       <m:e>
                         <m:r>
-                          <a:rPr lang="en-US" sz="2000" i="1"/>
+                          <a:rPr lang="en-US" sz="2000" i="1">
+                            <a:latin typeface="Cambria Math" panose="02040503050406030204" pitchFamily="18" charset="0"/>
+                          </a:rPr>
                           <m:t>𝑥</m:t>
                         </m:r>
                         <m:r>
-                          <a:rPr lang="en-US" sz="2000" i="1"/>
+                          <a:rPr lang="en-US" sz="2000" i="1">
+                            <a:latin typeface="Cambria Math" panose="02040503050406030204" pitchFamily="18" charset="0"/>
+                          </a:rPr>
                           <m:t>,</m:t>
                         </m:r>
                         <m:r>
-                          <a:rPr lang="en-US" sz="2000" i="1"/>
+                          <a:rPr lang="en-US" sz="2000" i="1">
+                            <a:latin typeface="Cambria Math" panose="02040503050406030204" pitchFamily="18" charset="0"/>
+                          </a:rPr>
                           <m:t>𝑦</m:t>
                         </m:r>
                         <m:r>
-                          <a:rPr lang="en-US" sz="2000" i="1"/>
+                          <a:rPr lang="en-US" sz="2000" i="1">
+                            <a:latin typeface="Cambria Math" panose="02040503050406030204" pitchFamily="18" charset="0"/>
+                          </a:rPr>
                           <m:t>−1</m:t>
                         </m:r>
                       </m:e>
                     </m:d>
                     <m:r>
-                      <a:rPr lang="en-US" sz="2000" i="1"/>
+                      <a:rPr lang="en-US" sz="2000" i="1">
+                        <a:latin typeface="Cambria Math" panose="02040503050406030204" pitchFamily="18" charset="0"/>
+                      </a:rPr>
                       <m:t>−</m:t>
                     </m:r>
                     <m:r>
-                      <a:rPr lang="en-US" sz="2000" i="1"/>
+                      <a:rPr lang="en-US" sz="2000" i="1">
+                        <a:latin typeface="Cambria Math" panose="02040503050406030204" pitchFamily="18" charset="0"/>
+                      </a:rPr>
                       <m:t>𝐼</m:t>
                     </m:r>
                     <m:r>
-                      <a:rPr lang="en-US" sz="2000" i="1"/>
+                      <a:rPr lang="en-US" sz="2000" i="1">
+                        <a:latin typeface="Cambria Math" panose="02040503050406030204" pitchFamily="18" charset="0"/>
+                      </a:rPr>
                       <m:t>(</m:t>
                     </m:r>
                     <m:r>
-                      <a:rPr lang="en-US" sz="2000" i="1"/>
+                      <a:rPr lang="en-US" sz="2000" i="1">
+                        <a:latin typeface="Cambria Math" panose="02040503050406030204" pitchFamily="18" charset="0"/>
+                      </a:rPr>
                       <m:t>𝑥</m:t>
                     </m:r>
                     <m:r>
-                      <a:rPr lang="en-US" sz="2000" i="1"/>
+                      <a:rPr lang="en-US" sz="2000" i="1">
+                        <a:latin typeface="Cambria Math" panose="02040503050406030204" pitchFamily="18" charset="0"/>
+                      </a:rPr>
                       <m:t>−1,</m:t>
                     </m:r>
                     <m:r>
-                      <a:rPr lang="en-US" sz="2000" i="1"/>
+                      <a:rPr lang="en-US" sz="2000" i="1">
+                        <a:latin typeface="Cambria Math" panose="02040503050406030204" pitchFamily="18" charset="0"/>
+                      </a:rPr>
                       <m:t>𝑦</m:t>
                     </m:r>
                     <m:r>
-                      <a:rPr lang="en-US" sz="2000" i="1"/>
+                      <a:rPr lang="en-US" sz="2000" i="1">
+                        <a:latin typeface="Cambria Math" panose="02040503050406030204" pitchFamily="18" charset="0"/>
+                      </a:rPr>
                       <m:t>−1)</m:t>
                     </m:r>
                   </m:oMath>
@@ -6421,7 +7037,7 @@
             </p:txBody>
           </p:sp>
         </mc:Choice>
-        <mc:Fallback>
+        <mc:Fallback xmlns="">
           <p:sp>
             <p:nvSpPr>
               <p:cNvPr id="3" name="Content Placeholder 2">
@@ -6523,8 +7139,8 @@
           </a:p>
         </p:txBody>
       </p:sp>
-      <mc:AlternateContent xmlns:mc="http://schemas.openxmlformats.org/markup-compatibility/2006">
-        <mc:Choice xmlns:a14="http://schemas.microsoft.com/office/drawing/2010/main" Requires="a14">
+      <mc:AlternateContent xmlns:mc="http://schemas.openxmlformats.org/markup-compatibility/2006" xmlns:a14="http://schemas.microsoft.com/office/drawing/2010/main">
+        <mc:Choice Requires="a14">
           <p:sp>
             <p:nvSpPr>
               <p:cNvPr id="3" name="Content Placeholder 2">
@@ -6560,48 +7176,64 @@
                     <m:d>
                       <m:dPr>
                         <m:ctrlPr>
-                          <a:rPr lang="en-IN" sz="2000" i="1"/>
+                          <a:rPr lang="en-IN" sz="2000" i="1">
+                            <a:latin typeface="Cambria Math" panose="02040503050406030204" pitchFamily="18" charset="0"/>
+                          </a:rPr>
                         </m:ctrlPr>
                       </m:dPr>
                       <m:e>
                         <m:sSub>
                           <m:sSubPr>
                             <m:ctrlPr>
-                              <a:rPr lang="en-IN" sz="2000" i="1"/>
+                              <a:rPr lang="en-IN" sz="2000" i="1">
+                                <a:latin typeface="Cambria Math" panose="02040503050406030204" pitchFamily="18" charset="0"/>
+                              </a:rPr>
                             </m:ctrlPr>
                           </m:sSubPr>
                           <m:e>
                             <m:r>
-                              <a:rPr lang="en-US" sz="2000" i="1"/>
+                              <a:rPr lang="en-US" sz="2000" i="1">
+                                <a:latin typeface="Cambria Math" panose="02040503050406030204" pitchFamily="18" charset="0"/>
+                              </a:rPr>
                               <m:t>𝑥</m:t>
                             </m:r>
                           </m:e>
                           <m:sub>
                             <m:r>
-                              <a:rPr lang="en-US" sz="2000" i="1"/>
+                              <a:rPr lang="en-US" sz="2000" i="1">
+                                <a:latin typeface="Cambria Math" panose="02040503050406030204" pitchFamily="18" charset="0"/>
+                              </a:rPr>
                               <m:t>1</m:t>
                             </m:r>
                           </m:sub>
                         </m:sSub>
                         <m:r>
-                          <a:rPr lang="en-US" sz="2000" i="1"/>
+                          <a:rPr lang="en-US" sz="2000" i="1">
+                            <a:latin typeface="Cambria Math" panose="02040503050406030204" pitchFamily="18" charset="0"/>
+                          </a:rPr>
                           <m:t>, </m:t>
                         </m:r>
                         <m:sSub>
                           <m:sSubPr>
                             <m:ctrlPr>
-                              <a:rPr lang="en-IN" sz="2000" i="1"/>
+                              <a:rPr lang="en-IN" sz="2000" i="1">
+                                <a:latin typeface="Cambria Math" panose="02040503050406030204" pitchFamily="18" charset="0"/>
+                              </a:rPr>
                             </m:ctrlPr>
                           </m:sSubPr>
                           <m:e>
                             <m:r>
-                              <a:rPr lang="en-US" sz="2000" i="1"/>
+                              <a:rPr lang="en-US" sz="2000" i="1">
+                                <a:latin typeface="Cambria Math" panose="02040503050406030204" pitchFamily="18" charset="0"/>
+                              </a:rPr>
                               <m:t>𝑦</m:t>
                             </m:r>
                           </m:e>
                           <m:sub>
                             <m:r>
-                              <a:rPr lang="en-US" sz="2000" i="1"/>
+                              <a:rPr lang="en-US" sz="2000" i="1">
+                                <a:latin typeface="Cambria Math" panose="02040503050406030204" pitchFamily="18" charset="0"/>
+                              </a:rPr>
                               <m:t>1</m:t>
                             </m:r>
                           </m:sub>
@@ -6622,48 +7254,64 @@
                     <m:d>
                       <m:dPr>
                         <m:ctrlPr>
-                          <a:rPr lang="en-IN" sz="2000" i="1"/>
+                          <a:rPr lang="en-IN" sz="2000" i="1">
+                            <a:latin typeface="Cambria Math" panose="02040503050406030204" pitchFamily="18" charset="0"/>
+                          </a:rPr>
                         </m:ctrlPr>
                       </m:dPr>
                       <m:e>
                         <m:sSub>
                           <m:sSubPr>
                             <m:ctrlPr>
-                              <a:rPr lang="en-IN" sz="2000" i="1"/>
+                              <a:rPr lang="en-IN" sz="2000" i="1">
+                                <a:latin typeface="Cambria Math" panose="02040503050406030204" pitchFamily="18" charset="0"/>
+                              </a:rPr>
                             </m:ctrlPr>
                           </m:sSubPr>
                           <m:e>
                             <m:r>
-                              <a:rPr lang="en-US" sz="2000" i="1"/>
+                              <a:rPr lang="en-US" sz="2000" i="1">
+                                <a:latin typeface="Cambria Math" panose="02040503050406030204" pitchFamily="18" charset="0"/>
+                              </a:rPr>
                               <m:t>𝑥</m:t>
                             </m:r>
                           </m:e>
                           <m:sub>
                             <m:r>
-                              <a:rPr lang="en-US" sz="2000" i="1"/>
+                              <a:rPr lang="en-US" sz="2000" i="1">
+                                <a:latin typeface="Cambria Math" panose="02040503050406030204" pitchFamily="18" charset="0"/>
+                              </a:rPr>
                               <m:t>2</m:t>
                             </m:r>
                           </m:sub>
                         </m:sSub>
                         <m:r>
-                          <a:rPr lang="en-US" sz="2000" i="1"/>
+                          <a:rPr lang="en-US" sz="2000" i="1">
+                            <a:latin typeface="Cambria Math" panose="02040503050406030204" pitchFamily="18" charset="0"/>
+                          </a:rPr>
                           <m:t>, </m:t>
                         </m:r>
                         <m:sSub>
                           <m:sSubPr>
                             <m:ctrlPr>
-                              <a:rPr lang="en-IN" sz="2000" i="1"/>
+                              <a:rPr lang="en-IN" sz="2000" i="1">
+                                <a:latin typeface="Cambria Math" panose="02040503050406030204" pitchFamily="18" charset="0"/>
+                              </a:rPr>
                             </m:ctrlPr>
                           </m:sSubPr>
                           <m:e>
                             <m:r>
-                              <a:rPr lang="en-US" sz="2000" i="1"/>
+                              <a:rPr lang="en-US" sz="2000" i="1">
+                                <a:latin typeface="Cambria Math" panose="02040503050406030204" pitchFamily="18" charset="0"/>
+                              </a:rPr>
                               <m:t>𝑦</m:t>
                             </m:r>
                           </m:e>
                           <m:sub>
                             <m:r>
-                              <a:rPr lang="en-US" sz="2000" i="1"/>
+                              <a:rPr lang="en-US" sz="2000" i="1">
+                                <a:latin typeface="Cambria Math" panose="02040503050406030204" pitchFamily="18" charset="0"/>
+                              </a:rPr>
                               <m:t>2</m:t>
                             </m:r>
                           </m:sub>
@@ -6710,7 +7358,7 @@
             </p:txBody>
           </p:sp>
         </mc:Choice>
-        <mc:Fallback>
+        <mc:Fallback xmlns="">
           <p:sp>
             <p:nvSpPr>
               <p:cNvPr id="3" name="Content Placeholder 2">
@@ -6842,8 +7490,8 @@
           </a:p>
         </p:txBody>
       </p:sp>
-      <mc:AlternateContent xmlns:mc="http://schemas.openxmlformats.org/markup-compatibility/2006">
-        <mc:Choice xmlns:a14="http://schemas.microsoft.com/office/drawing/2010/main" Requires="a14">
+      <mc:AlternateContent xmlns:mc="http://schemas.openxmlformats.org/markup-compatibility/2006" xmlns:a14="http://schemas.microsoft.com/office/drawing/2010/main">
+        <mc:Choice Requires="a14">
           <p:sp>
             <p:nvSpPr>
               <p:cNvPr id="3" name="Content Placeholder 2">
@@ -6875,26 +7523,36 @@
                 <a14:m>
                   <m:oMath xmlns:m="http://schemas.openxmlformats.org/officeDocument/2006/math">
                     <m:r>
-                      <a:rPr lang="en-US" sz="2000" i="1"/>
+                      <a:rPr lang="en-US" sz="2000" i="1">
+                        <a:latin typeface="Cambria Math" panose="02040503050406030204" pitchFamily="18" charset="0"/>
+                      </a:rPr>
                       <m:t>𝑓</m:t>
                     </m:r>
                     <m:d>
                       <m:dPr>
                         <m:ctrlPr>
-                          <a:rPr lang="en-IN" sz="2000" i="1"/>
+                          <a:rPr lang="en-IN" sz="2000" i="1">
+                            <a:latin typeface="Cambria Math" panose="02040503050406030204" pitchFamily="18" charset="0"/>
+                          </a:rPr>
                         </m:ctrlPr>
                       </m:dPr>
                       <m:e>
                         <m:r>
-                          <a:rPr lang="en-US" sz="2000" i="1"/>
+                          <a:rPr lang="en-US" sz="2000" i="1">
+                            <a:latin typeface="Cambria Math" panose="02040503050406030204" pitchFamily="18" charset="0"/>
+                          </a:rPr>
                           <m:t>𝑥</m:t>
                         </m:r>
                         <m:r>
-                          <a:rPr lang="en-US" sz="2000" i="1"/>
+                          <a:rPr lang="en-US" sz="2000" i="1">
+                            <a:latin typeface="Cambria Math" panose="02040503050406030204" pitchFamily="18" charset="0"/>
+                          </a:rPr>
                           <m:t>,</m:t>
                         </m:r>
                         <m:r>
-                          <a:rPr lang="en-US" sz="2000" i="1"/>
+                          <a:rPr lang="en-US" sz="2000" i="1">
+                            <a:latin typeface="Cambria Math" panose="02040503050406030204" pitchFamily="18" charset="0"/>
+                          </a:rPr>
                           <m:t>𝑦</m:t>
                         </m:r>
                       </m:e>
@@ -6927,7 +7585,7 @@
             </p:txBody>
           </p:sp>
         </mc:Choice>
-        <mc:Fallback>
+        <mc:Fallback xmlns="">
           <p:sp>
             <p:nvSpPr>
               <p:cNvPr id="3" name="Content Placeholder 2">
@@ -7204,8 +7862,8 @@
           </a:p>
         </p:txBody>
       </p:sp>
-      <mc:AlternateContent xmlns:mc="http://schemas.openxmlformats.org/markup-compatibility/2006">
-        <mc:Choice xmlns:a14="http://schemas.microsoft.com/office/drawing/2010/main" Requires="a14">
+      <mc:AlternateContent xmlns:mc="http://schemas.openxmlformats.org/markup-compatibility/2006" xmlns:a14="http://schemas.microsoft.com/office/drawing/2010/main">
+        <mc:Choice Requires="a14">
           <p:sp>
             <p:nvSpPr>
               <p:cNvPr id="3" name="Content Placeholder 2">
@@ -7284,11 +7942,15 @@
                 <a14:m>
                   <m:oMath xmlns:m="http://schemas.openxmlformats.org/officeDocument/2006/math">
                     <m:r>
-                      <a:rPr lang="en-US" sz="2000" i="1"/>
+                      <a:rPr lang="en-US" sz="2000" i="1">
+                        <a:latin typeface="Cambria Math" panose="02040503050406030204" pitchFamily="18" charset="0"/>
+                      </a:rPr>
                       <m:t>𝑇</m:t>
                     </m:r>
                     <m:r>
-                      <a:rPr lang="en-US" sz="2000" i="1"/>
+                      <a:rPr lang="en-US" sz="2000" i="1">
+                        <a:latin typeface="Cambria Math" panose="02040503050406030204" pitchFamily="18" charset="0"/>
+                      </a:rPr>
                       <m:t> %</m:t>
                     </m:r>
                   </m:oMath>
@@ -7333,7 +7995,7 @@
             </p:txBody>
           </p:sp>
         </mc:Choice>
-        <mc:Fallback>
+        <mc:Fallback xmlns="">
           <p:sp>
             <p:nvSpPr>
               <p:cNvPr id="3" name="Content Placeholder 2">

</xml_diff>